<commit_message>
Modification du rapport powerpoint
</commit_message>
<xml_diff>
--- a/LISEZ MOI/rapport powerpoint.pptx
+++ b/LISEZ MOI/rapport powerpoint.pptx
@@ -16,6 +16,7 @@
     <p:sldId id="264" r:id="rId10"/>
     <p:sldId id="265" r:id="rId11"/>
     <p:sldId id="266" r:id="rId12"/>
+    <p:sldId id="267" r:id="rId13"/>
   </p:sldIdLst>
   <p:sldSz cx="9144000" cy="6858000" type="screen4x3"/>
   <p:notesSz cx="6858000" cy="9144000"/>
@@ -17381,38 +17382,19 @@
           <a:p>
             <a:r>
               <a:rPr lang="fr-FR" b="1" dirty="0" smtClean="0"/>
-              <a:t>Loubna : Design, mise en </a:t>
+              <a:t>Loubna : Design, mise en page, JavaScript, logos, icônes</a:t>
             </a:r>
-            <a:r>
-              <a:rPr lang="fr-FR" b="1" dirty="0" smtClean="0"/>
-              <a:t>page, </a:t>
-            </a:r>
-            <a:r>
-              <a:rPr lang="fr-FR" b="1" dirty="0" smtClean="0"/>
-              <a:t>JavaScript, logos, icônes</a:t>
-            </a:r>
-            <a:endParaRPr lang="fr-FR" b="1" dirty="0" smtClean="0"/>
           </a:p>
           <a:p>
             <a:r>
               <a:rPr lang="fr-FR" b="1" dirty="0" smtClean="0"/>
-              <a:t>Quentin </a:t>
-            </a:r>
-            <a:r>
-              <a:rPr lang="fr-FR" b="1" dirty="0" smtClean="0"/>
-              <a:t>: </a:t>
+              <a:t>Quentin : </a:t>
             </a:r>
             <a:r>
               <a:rPr lang="fr-FR" dirty="0">
                 <a:effectLst/>
               </a:rPr>
-              <a:t>Inscription / connexion / déconnexion, contact, base de données</a:t>
-            </a:r>
-            <a:r>
-              <a:rPr lang="fr-FR" dirty="0">
-                <a:effectLst/>
-              </a:rPr>
-              <a:t> </a:t>
+              <a:t>Inscription / connexion / déconnexion, contact, base de données </a:t>
             </a:r>
             <a:endParaRPr lang="fr-FR" b="1" dirty="0" smtClean="0"/>
           </a:p>
@@ -17425,13 +17407,7 @@
               <a:rPr lang="fr-FR" dirty="0">
                 <a:effectLst/>
               </a:rPr>
-              <a:t>Synthèse PowerPoint, messagerie, page d’accueil</a:t>
-            </a:r>
-            <a:r>
-              <a:rPr lang="fr-FR" dirty="0">
-                <a:effectLst/>
-              </a:rPr>
-              <a:t> </a:t>
+              <a:t>Synthèse PowerPoint, messagerie, page d’accueil </a:t>
             </a:r>
             <a:endParaRPr lang="fr-FR" dirty="0" smtClean="0">
               <a:effectLst/>
@@ -17468,6 +17444,78 @@
     <p:extLst>
       <p:ext uri="{BB962C8B-B14F-4D97-AF65-F5344CB8AC3E}">
         <p14:creationId xmlns:p14="http://schemas.microsoft.com/office/powerpoint/2010/main" val="3693924220"/>
+      </p:ext>
+    </p:extLst>
+  </p:cSld>
+  <p:clrMapOvr>
+    <a:masterClrMapping/>
+  </p:clrMapOvr>
+  <mc:AlternateContent xmlns:mc="http://schemas.openxmlformats.org/markup-compatibility/2006" xmlns:p14="http://schemas.microsoft.com/office/powerpoint/2010/main">
+    <mc:Choice Requires="p14">
+      <p:transition spd="slow" p14:dur="1200">
+        <p14:flip dir="r"/>
+      </p:transition>
+    </mc:Choice>
+    <mc:Fallback xmlns="">
+      <p:transition xmlns:p14="http://schemas.microsoft.com/office/powerpoint/2010/main" spd="slow">
+        <p:fade/>
+      </p:transition>
+    </mc:Fallback>
+  </mc:AlternateContent>
+</p:sld>
+</file>
+
+<file path=ppt/slides/slide12.xml><?xml version="1.0" encoding="utf-8"?>
+<p:sld xmlns:a="http://schemas.openxmlformats.org/drawingml/2006/main" xmlns:r="http://schemas.openxmlformats.org/officeDocument/2006/relationships" xmlns:p="http://schemas.openxmlformats.org/presentationml/2006/main">
+  <p:cSld>
+    <p:spTree>
+      <p:nvGrpSpPr>
+        <p:cNvPr id="1" name=""/>
+        <p:cNvGrpSpPr/>
+        <p:nvPr/>
+      </p:nvGrpSpPr>
+      <p:grpSpPr>
+        <a:xfrm>
+          <a:off x="0" y="0"/>
+          <a:ext cx="0" cy="0"/>
+          <a:chOff x="0" y="0"/>
+          <a:chExt cx="0" cy="0"/>
+        </a:xfrm>
+      </p:grpSpPr>
+      <p:pic>
+        <p:nvPicPr>
+          <p:cNvPr id="2" name="Image 1" descr="questions.png"/>
+          <p:cNvPicPr>
+            <a:picLocks noChangeAspect="1"/>
+          </p:cNvPicPr>
+          <p:nvPr/>
+        </p:nvPicPr>
+        <p:blipFill>
+          <a:blip r:embed="rId2">
+            <a:extLst>
+              <a:ext uri="{28A0092B-C50C-407E-A947-70E740481C1C}">
+                <a14:useLocalDpi xmlns:a14="http://schemas.microsoft.com/office/drawing/2010/main" val="0"/>
+              </a:ext>
+            </a:extLst>
+          </a:blip>
+          <a:stretch>
+            <a:fillRect/>
+          </a:stretch>
+        </p:blipFill>
+        <p:spPr>
+          <a:xfrm>
+            <a:off x="1111138" y="535074"/>
+            <a:ext cx="6502400" cy="6502400"/>
+          </a:xfrm>
+          <a:prstGeom prst="rect">
+            <a:avLst/>
+          </a:prstGeom>
+        </p:spPr>
+      </p:pic>
+    </p:spTree>
+    <p:extLst>
+      <p:ext uri="{BB962C8B-B14F-4D97-AF65-F5344CB8AC3E}">
+        <p14:creationId xmlns:p14="http://schemas.microsoft.com/office/powerpoint/2010/main" val="1089517990"/>
       </p:ext>
     </p:extLst>
   </p:cSld>
@@ -18335,7 +18383,7 @@
         <p:spPr/>
         <p:txBody>
           <a:bodyPr>
-            <a:normAutofit/>
+            <a:normAutofit fontScale="92500"/>
           </a:bodyPr>
           <a:lstStyle/>
           <a:p>
@@ -18353,14 +18401,20 @@
           <a:p>
             <a:r>
               <a:rPr lang="fr-FR" dirty="0" smtClean="0"/>
-              <a:t>Création d’un panel d’administration (suppression de trajet, bannissement d’utilisateurs….)</a:t>
+              <a:t>Création d’un panel d’administration (suppression de trajet, bannissement d’utilisateurs….</a:t>
             </a:r>
+            <a:r>
+              <a:rPr lang="fr-FR" dirty="0" smtClean="0"/>
+              <a:t>)</a:t>
+            </a:r>
+            <a:endParaRPr lang="fr-FR" dirty="0"/>
           </a:p>
           <a:p>
-            <a:pPr marL="0" indent="0">
-              <a:buNone/>
-            </a:pPr>
-            <a:endParaRPr lang="fr-FR" dirty="0"/>
+            <a:r>
+              <a:rPr lang="fr-FR" dirty="0" smtClean="0"/>
+              <a:t>Gestion des erreurs 404 avec redirection automatique</a:t>
+            </a:r>
+            <a:endParaRPr lang="fr-FR" dirty="0" smtClean="0"/>
           </a:p>
         </p:txBody>
       </p:sp>

</xml_diff>

<commit_message>
Mise a jour des rapports
</commit_message>
<xml_diff>
--- a/LISEZ MOI/rapport powerpoint.pptx
+++ b/LISEZ MOI/rapport powerpoint.pptx
@@ -4796,7 +4796,7 @@
           <a:p>
             <a:fld id="{8F1B69E8-23E9-4C1F-AA2B-3C5BA6EDBEAE}" type="datetimeFigureOut">
               <a:rPr lang="en-US" smtClean="0"/>
-              <a:t>06/04/2014</a:t>
+              <a:t>08/04/2014</a:t>
             </a:fld>
             <a:endParaRPr lang="en-US" dirty="0"/>
           </a:p>
@@ -5182,7 +5182,7 @@
           <a:p>
             <a:fld id="{8F1B69E8-23E9-4C1F-AA2B-3C5BA6EDBEAE}" type="datetimeFigureOut">
               <a:rPr lang="en-US" smtClean="0"/>
-              <a:t>06/04/2014</a:t>
+              <a:t>08/04/2014</a:t>
             </a:fld>
             <a:endParaRPr lang="en-US" dirty="0"/>
           </a:p>
@@ -5571,7 +5571,7 @@
           <a:p>
             <a:fld id="{8F1B69E8-23E9-4C1F-AA2B-3C5BA6EDBEAE}" type="datetimeFigureOut">
               <a:rPr lang="en-US" smtClean="0"/>
-              <a:t>06/04/2014</a:t>
+              <a:t>08/04/2014</a:t>
             </a:fld>
             <a:endParaRPr lang="en-US" dirty="0"/>
           </a:p>
@@ -6092,7 +6092,7 @@
           <a:p>
             <a:fld id="{8F1B69E8-23E9-4C1F-AA2B-3C5BA6EDBEAE}" type="datetimeFigureOut">
               <a:rPr lang="en-US" smtClean="0"/>
-              <a:t>06/04/2014</a:t>
+              <a:t>08/04/2014</a:t>
             </a:fld>
             <a:endParaRPr lang="en-US" dirty="0"/>
           </a:p>
@@ -6345,7 +6345,7 @@
           <a:p>
             <a:fld id="{8F1B69E8-23E9-4C1F-AA2B-3C5BA6EDBEAE}" type="datetimeFigureOut">
               <a:rPr lang="en-US" smtClean="0"/>
-              <a:t>06/04/2014</a:t>
+              <a:t>08/04/2014</a:t>
             </a:fld>
             <a:endParaRPr lang="en-US" dirty="0"/>
           </a:p>
@@ -6588,7 +6588,7 @@
           <a:p>
             <a:fld id="{8F1B69E8-23E9-4C1F-AA2B-3C5BA6EDBEAE}" type="datetimeFigureOut">
               <a:rPr lang="en-US" smtClean="0"/>
-              <a:t>06/04/2014</a:t>
+              <a:t>08/04/2014</a:t>
             </a:fld>
             <a:endParaRPr lang="en-US" dirty="0"/>
           </a:p>
@@ -13980,7 +13980,7 @@
           <a:p>
             <a:fld id="{8F1B69E8-23E9-4C1F-AA2B-3C5BA6EDBEAE}" type="datetimeFigureOut">
               <a:rPr lang="en-US" smtClean="0"/>
-              <a:t>06/04/2014</a:t>
+              <a:t>08/04/2014</a:t>
             </a:fld>
             <a:endParaRPr lang="en-US" dirty="0"/>
           </a:p>
@@ -14529,7 +14529,7 @@
           <a:p>
             <a:fld id="{8F1B69E8-23E9-4C1F-AA2B-3C5BA6EDBEAE}" type="datetimeFigureOut">
               <a:rPr lang="en-US" smtClean="0"/>
-              <a:t>06/04/2014</a:t>
+              <a:t>08/04/2014</a:t>
             </a:fld>
             <a:endParaRPr lang="en-US" dirty="0"/>
           </a:p>
@@ -14716,7 +14716,7 @@
           <a:p>
             <a:fld id="{8F1B69E8-23E9-4C1F-AA2B-3C5BA6EDBEAE}" type="datetimeFigureOut">
               <a:rPr lang="en-US" smtClean="0"/>
-              <a:t>06/04/2014</a:t>
+              <a:t>08/04/2014</a:t>
             </a:fld>
             <a:endParaRPr lang="en-US" dirty="0"/>
           </a:p>
@@ -14818,7 +14818,7 @@
           <a:p>
             <a:fld id="{8F1B69E8-23E9-4C1F-AA2B-3C5BA6EDBEAE}" type="datetimeFigureOut">
               <a:rPr lang="en-US" smtClean="0"/>
-              <a:t>06/04/2014</a:t>
+              <a:t>08/04/2014</a:t>
             </a:fld>
             <a:endParaRPr lang="en-US" dirty="0"/>
           </a:p>
@@ -15166,7 +15166,7 @@
           <a:p>
             <a:fld id="{8F1B69E8-23E9-4C1F-AA2B-3C5BA6EDBEAE}" type="datetimeFigureOut">
               <a:rPr lang="en-US" smtClean="0"/>
-              <a:t>06/04/2014</a:t>
+              <a:t>08/04/2014</a:t>
             </a:fld>
             <a:endParaRPr lang="en-US" dirty="0"/>
           </a:p>
@@ -16598,7 +16598,7 @@
           <a:p>
             <a:fld id="{8F1B69E8-23E9-4C1F-AA2B-3C5BA6EDBEAE}" type="datetimeFigureOut">
               <a:rPr lang="en-US" smtClean="0"/>
-              <a:t>06/04/2014</a:t>
+              <a:t>08/04/2014</a:t>
             </a:fld>
             <a:endParaRPr lang="en-US" dirty="0"/>
           </a:p>
@@ -17396,7 +17396,7 @@
               </a:rPr>
               <a:t>Inscription / connexion / déconnexion, contact, base de données </a:t>
             </a:r>
-            <a:endParaRPr lang="fr-FR" b="1" dirty="0" smtClean="0"/>
+            <a:endParaRPr lang="fr-FR" dirty="0" smtClean="0"/>
           </a:p>
           <a:p>
             <a:r>
@@ -18059,29 +18059,36 @@
           </a:p>
         </p:txBody>
       </p:sp>
-      <p:sp>
-        <p:nvSpPr>
-          <p:cNvPr id="3" name="Espace réservé du contenu 2"/>
-          <p:cNvSpPr>
-            <a:spLocks noGrp="1"/>
-          </p:cNvSpPr>
-          <p:nvPr>
-            <p:ph idx="1"/>
-          </p:nvPr>
-        </p:nvSpPr>
-        <p:spPr/>
-        <p:txBody>
-          <a:bodyPr/>
-          <a:lstStyle/>
-          <a:p>
-            <a:r>
-              <a:rPr lang="fr-FR" smtClean="0"/>
-              <a:t>VIDEO EXPLICATIVE</a:t>
-            </a:r>
-            <a:endParaRPr lang="fr-FR" dirty="0"/>
-          </a:p>
-        </p:txBody>
-      </p:sp>
+      <p:pic>
+        <p:nvPicPr>
+          <p:cNvPr id="4" name="Image 3" descr="Capture d’écran 2014-04-08 à 16.20.49.png"/>
+          <p:cNvPicPr>
+            <a:picLocks noChangeAspect="1"/>
+          </p:cNvPicPr>
+          <p:nvPr/>
+        </p:nvPicPr>
+        <p:blipFill>
+          <a:blip r:embed="rId2">
+            <a:extLst>
+              <a:ext uri="{28A0092B-C50C-407E-A947-70E740481C1C}">
+                <a14:useLocalDpi xmlns:a14="http://schemas.microsoft.com/office/drawing/2010/main" val="0"/>
+              </a:ext>
+            </a:extLst>
+          </a:blip>
+          <a:stretch>
+            <a:fillRect/>
+          </a:stretch>
+        </p:blipFill>
+        <p:spPr>
+          <a:xfrm>
+            <a:off x="0" y="3523985"/>
+            <a:ext cx="9144000" cy="2091690"/>
+          </a:xfrm>
+          <a:prstGeom prst="rect">
+            <a:avLst/>
+          </a:prstGeom>
+        </p:spPr>
+      </p:pic>
     </p:spTree>
     <p:extLst>
       <p:ext uri="{BB962C8B-B14F-4D97-AF65-F5344CB8AC3E}">
@@ -18401,11 +18408,7 @@
           <a:p>
             <a:r>
               <a:rPr lang="fr-FR" dirty="0" smtClean="0"/>
-              <a:t>Création d’un panel d’administration (suppression de trajet, bannissement d’utilisateurs….</a:t>
-            </a:r>
-            <a:r>
-              <a:rPr lang="fr-FR" dirty="0" smtClean="0"/>
-              <a:t>)</a:t>
+              <a:t>Création d’un panel d’administration (suppression de trajet, bannissement d’utilisateurs….)</a:t>
             </a:r>
             <a:endParaRPr lang="fr-FR" dirty="0"/>
           </a:p>
@@ -18414,7 +18417,6 @@
               <a:rPr lang="fr-FR" dirty="0" smtClean="0"/>
               <a:t>Gestion des erreurs 404 avec redirection automatique</a:t>
             </a:r>
-            <a:endParaRPr lang="fr-FR" dirty="0" smtClean="0"/>
           </a:p>
         </p:txBody>
       </p:sp>

</xml_diff>